<commit_message>
Laravel Form & CRUD
</commit_message>
<xml_diff>
--- a/6. Collection & Array/Laravel Collection.pptx
+++ b/6. Collection & Array/Laravel Collection.pptx
@@ -4809,7 +4809,7 @@
                 <a:latin typeface="Courier New" panose="02070309020205020404" pitchFamily="49" charset="0"/>
                 <a:cs typeface="Courier New" panose="02070309020205020404" pitchFamily="49" charset="0"/>
               </a:rPr>
-              <a:t>return $value &gt; 5;</a:t>
+              <a:t>	return $value == 2;</a:t>
             </a:r>
           </a:p>
           <a:p>
@@ -4845,7 +4845,7 @@
                 <a:latin typeface="Courier New" panose="02070309020205020404" pitchFamily="49" charset="0"/>
                 <a:cs typeface="Courier New" panose="02070309020205020404" pitchFamily="49" charset="0"/>
               </a:rPr>
-              <a:t>// false</a:t>
+              <a:t>// true</a:t>
             </a:r>
           </a:p>
         </p:txBody>
@@ -4979,13 +4979,10 @@
             <a:pPr marL="118872" indent="0">
               <a:buNone/>
             </a:pPr>
-            <a:r>
-              <a:rPr lang="en-MY" sz="1800" b="1">
-                <a:latin typeface="Courier New" panose="02070309020205020404" pitchFamily="49" charset="0"/>
-                <a:cs typeface="Courier New" panose="02070309020205020404" pitchFamily="49" charset="0"/>
-              </a:rPr>
-              <a:t> </a:t>
-            </a:r>
+            <a:endParaRPr lang="en-MY" sz="1800" b="1">
+              <a:latin typeface="Courier New" panose="02070309020205020404" pitchFamily="49" charset="0"/>
+              <a:cs typeface="Courier New" panose="02070309020205020404" pitchFamily="49" charset="0"/>
+            </a:endParaRPr>
           </a:p>
           <a:p>
             <a:pPr marL="118872" indent="0">
@@ -5557,7 +5554,7 @@
                 <a:latin typeface="Courier New" panose="02070309020205020404" pitchFamily="49" charset="0"/>
                 <a:cs typeface="Courier New" panose="02070309020205020404" pitchFamily="49" charset="0"/>
               </a:rPr>
-              <a:t>// [2 =&gt; 'a', 4 =&gt; 'b']</a:t>
+              <a:t>// [2 =&gt; 'a’, 2 =&gt; 'b']</a:t>
             </a:r>
           </a:p>
         </p:txBody>
@@ -5823,7 +5820,7 @@
                 <a:latin typeface="Courier New" panose="02070309020205020404" pitchFamily="49" charset="0"/>
                 <a:cs typeface="Courier New" panose="02070309020205020404" pitchFamily="49" charset="0"/>
               </a:rPr>
-              <a:t>	return $value &gt; 2;</a:t>
+              <a:t>	return $value &gt; 0;</a:t>
             </a:r>
           </a:p>
           <a:p>
@@ -5859,7 +5856,7 @@
                 <a:latin typeface="Courier New" panose="02070309020205020404" pitchFamily="49" charset="0"/>
                 <a:cs typeface="Courier New" panose="02070309020205020404" pitchFamily="49" charset="0"/>
               </a:rPr>
-              <a:t>// false</a:t>
+              <a:t>// true</a:t>
             </a:r>
           </a:p>
         </p:txBody>
@@ -7207,7 +7204,28 @@
                 <a:latin typeface="Courier New" panose="02070309020205020404" pitchFamily="49" charset="0"/>
                 <a:cs typeface="Courier New" panose="02070309020205020404" pitchFamily="49" charset="0"/>
               </a:rPr>
-              <a:t>// ['framework' =&gt; 'laravel']</a:t>
+              <a:t>// ['framework' =&gt; ‘laravel’]</a:t>
+            </a:r>
+          </a:p>
+          <a:p>
+            <a:pPr marL="118872" indent="0">
+              <a:buNone/>
+            </a:pPr>
+            <a:endParaRPr lang="en-MY" sz="1800" b="1">
+              <a:latin typeface="Courier New" panose="02070309020205020404" pitchFamily="49" charset="0"/>
+              <a:cs typeface="Courier New" panose="02070309020205020404" pitchFamily="49" charset="0"/>
+            </a:endParaRPr>
+          </a:p>
+          <a:p>
+            <a:pPr marL="118872" indent="0">
+              <a:buNone/>
+            </a:pPr>
+            <a:r>
+              <a:rPr lang="en-MY" sz="1800" b="1">
+                <a:latin typeface="Courier New" panose="02070309020205020404" pitchFamily="49" charset="0"/>
+                <a:cs typeface="Courier New" panose="02070309020205020404" pitchFamily="49" charset="0"/>
+              </a:rPr>
+              <a:t>[‘name’, ‘framework’]</a:t>
             </a:r>
           </a:p>
         </p:txBody>
@@ -7672,7 +7690,7 @@
                 <a:latin typeface="Courier New" panose="02070309020205020404" pitchFamily="49" charset="0"/>
                 <a:cs typeface="Courier New" panose="02070309020205020404" pitchFamily="49" charset="0"/>
               </a:rPr>
-              <a:t>$collection-&gt;implode('product', ', ');</a:t>
+              <a:t>$collection-&gt;implode('product', ‘| ');</a:t>
             </a:r>
           </a:p>
           <a:p>
@@ -7696,7 +7714,7 @@
                 <a:latin typeface="Courier New" panose="02070309020205020404" pitchFamily="49" charset="0"/>
                 <a:cs typeface="Courier New" panose="02070309020205020404" pitchFamily="49" charset="0"/>
               </a:rPr>
-              <a:t>// Desk, Chair</a:t>
+              <a:t>// Desk| Chair</a:t>
             </a:r>
           </a:p>
         </p:txBody>
@@ -8381,7 +8399,7 @@
         <p:spPr/>
         <p:txBody>
           <a:bodyPr>
-            <a:normAutofit/>
+            <a:normAutofit fontScale="92500" lnSpcReduction="10000"/>
           </a:bodyPr>
           <a:lstStyle/>
           <a:p>
@@ -8402,55 +8420,151 @@
                 <a:latin typeface="Courier New" panose="02070309020205020404" pitchFamily="49" charset="0"/>
                 <a:cs typeface="Courier New" panose="02070309020205020404" pitchFamily="49" charset="0"/>
               </a:rPr>
-              <a:t>collect(['a', 'b', 'c'])-&gt;join(', '); // 'a, b, c'</a:t>
-            </a:r>
-          </a:p>
-          <a:p>
-            <a:pPr marL="118872" indent="0">
-              <a:buNone/>
-            </a:pPr>
-            <a:r>
-              <a:rPr lang="en-MY" sz="1800" b="1">
-                <a:latin typeface="Courier New" panose="02070309020205020404" pitchFamily="49" charset="0"/>
-                <a:cs typeface="Courier New" panose="02070309020205020404" pitchFamily="49" charset="0"/>
-              </a:rPr>
-              <a:t>collect(['a', 'b', 'c'])-&gt;join(', ', ', and '); // 'a, b, and c'</a:t>
-            </a:r>
-          </a:p>
-          <a:p>
-            <a:pPr marL="118872" indent="0">
-              <a:buNone/>
-            </a:pPr>
-            <a:r>
-              <a:rPr lang="en-MY" sz="1800" b="1">
-                <a:latin typeface="Courier New" panose="02070309020205020404" pitchFamily="49" charset="0"/>
-                <a:cs typeface="Courier New" panose="02070309020205020404" pitchFamily="49" charset="0"/>
-              </a:rPr>
-              <a:t>collect(['a', 'b'])-&gt;join(', ', ' and '); // 'a and b'</a:t>
-            </a:r>
-          </a:p>
-          <a:p>
-            <a:pPr marL="118872" indent="0">
-              <a:buNone/>
-            </a:pPr>
-            <a:r>
-              <a:rPr lang="en-MY" sz="1800" b="1">
-                <a:latin typeface="Courier New" panose="02070309020205020404" pitchFamily="49" charset="0"/>
-                <a:cs typeface="Courier New" panose="02070309020205020404" pitchFamily="49" charset="0"/>
-              </a:rPr>
-              <a:t>collect(['a'])-&gt;join(', ', ' and '); // 'a'</a:t>
-            </a:r>
-          </a:p>
-          <a:p>
-            <a:pPr marL="118872" indent="0">
-              <a:buNone/>
-            </a:pPr>
-            <a:r>
-              <a:rPr lang="en-MY" sz="1800" b="1">
-                <a:latin typeface="Courier New" panose="02070309020205020404" pitchFamily="49" charset="0"/>
-                <a:cs typeface="Courier New" panose="02070309020205020404" pitchFamily="49" charset="0"/>
-              </a:rPr>
-              <a:t>collect([])-&gt;join(', ', ' and '); // '</a:t>
+              <a:t>collect(['a', 'b', 'c'])-&gt;join(', ‘); </a:t>
+            </a:r>
+          </a:p>
+          <a:p>
+            <a:pPr marL="118872" indent="0">
+              <a:buNone/>
+            </a:pPr>
+            <a:r>
+              <a:rPr lang="en-MY" sz="1800" b="1">
+                <a:latin typeface="Courier New" panose="02070309020205020404" pitchFamily="49" charset="0"/>
+                <a:cs typeface="Courier New" panose="02070309020205020404" pitchFamily="49" charset="0"/>
+              </a:rPr>
+              <a:t>// 'a, b, c’</a:t>
+            </a:r>
+          </a:p>
+          <a:p>
+            <a:pPr marL="118872" indent="0">
+              <a:buNone/>
+            </a:pPr>
+            <a:endParaRPr lang="en-MY" sz="1800" b="1">
+              <a:latin typeface="Courier New" panose="02070309020205020404" pitchFamily="49" charset="0"/>
+              <a:cs typeface="Courier New" panose="02070309020205020404" pitchFamily="49" charset="0"/>
+            </a:endParaRPr>
+          </a:p>
+          <a:p>
+            <a:pPr marL="118872" indent="0">
+              <a:buNone/>
+            </a:pPr>
+            <a:r>
+              <a:rPr lang="en-MY" sz="1800" b="1">
+                <a:latin typeface="Courier New" panose="02070309020205020404" pitchFamily="49" charset="0"/>
+                <a:cs typeface="Courier New" panose="02070309020205020404" pitchFamily="49" charset="0"/>
+              </a:rPr>
+              <a:t>collect(['a', 'b', 'c'])-&gt;join(', ', ', and ‘); </a:t>
+            </a:r>
+          </a:p>
+          <a:p>
+            <a:pPr marL="118872" indent="0">
+              <a:buNone/>
+            </a:pPr>
+            <a:r>
+              <a:rPr lang="en-MY" sz="1800" b="1">
+                <a:latin typeface="Courier New" panose="02070309020205020404" pitchFamily="49" charset="0"/>
+                <a:cs typeface="Courier New" panose="02070309020205020404" pitchFamily="49" charset="0"/>
+              </a:rPr>
+              <a:t>// 'a, b, and c’</a:t>
+            </a:r>
+          </a:p>
+          <a:p>
+            <a:pPr marL="118872" indent="0">
+              <a:buNone/>
+            </a:pPr>
+            <a:endParaRPr lang="en-MY" sz="1800" b="1">
+              <a:latin typeface="Courier New" panose="02070309020205020404" pitchFamily="49" charset="0"/>
+              <a:cs typeface="Courier New" panose="02070309020205020404" pitchFamily="49" charset="0"/>
+            </a:endParaRPr>
+          </a:p>
+          <a:p>
+            <a:pPr marL="118872" indent="0">
+              <a:buNone/>
+            </a:pPr>
+            <a:r>
+              <a:rPr lang="en-MY" sz="1800" b="1">
+                <a:latin typeface="Courier New" panose="02070309020205020404" pitchFamily="49" charset="0"/>
+                <a:cs typeface="Courier New" panose="02070309020205020404" pitchFamily="49" charset="0"/>
+              </a:rPr>
+              <a:t>collect(['a', 'b'])-&gt;join(', ', ' and ‘); </a:t>
+            </a:r>
+          </a:p>
+          <a:p>
+            <a:pPr marL="118872" indent="0">
+              <a:buNone/>
+            </a:pPr>
+            <a:r>
+              <a:rPr lang="en-MY" sz="1800" b="1">
+                <a:latin typeface="Courier New" panose="02070309020205020404" pitchFamily="49" charset="0"/>
+                <a:cs typeface="Courier New" panose="02070309020205020404" pitchFamily="49" charset="0"/>
+              </a:rPr>
+              <a:t>// 'a and b’</a:t>
+            </a:r>
+          </a:p>
+          <a:p>
+            <a:pPr marL="118872" indent="0">
+              <a:buNone/>
+            </a:pPr>
+            <a:endParaRPr lang="en-MY" sz="1800" b="1">
+              <a:latin typeface="Courier New" panose="02070309020205020404" pitchFamily="49" charset="0"/>
+              <a:cs typeface="Courier New" panose="02070309020205020404" pitchFamily="49" charset="0"/>
+            </a:endParaRPr>
+          </a:p>
+          <a:p>
+            <a:pPr marL="118872" indent="0">
+              <a:buNone/>
+            </a:pPr>
+            <a:r>
+              <a:rPr lang="en-MY" sz="1800" b="1">
+                <a:latin typeface="Courier New" panose="02070309020205020404" pitchFamily="49" charset="0"/>
+                <a:cs typeface="Courier New" panose="02070309020205020404" pitchFamily="49" charset="0"/>
+              </a:rPr>
+              <a:t>collect(['a'])-&gt;join(', ', ' and ‘); </a:t>
+            </a:r>
+          </a:p>
+          <a:p>
+            <a:pPr marL="118872" indent="0">
+              <a:buNone/>
+            </a:pPr>
+            <a:r>
+              <a:rPr lang="en-MY" sz="1800" b="1">
+                <a:latin typeface="Courier New" panose="02070309020205020404" pitchFamily="49" charset="0"/>
+                <a:cs typeface="Courier New" panose="02070309020205020404" pitchFamily="49" charset="0"/>
+              </a:rPr>
+              <a:t>// 'a’</a:t>
+            </a:r>
+          </a:p>
+          <a:p>
+            <a:pPr marL="118872" indent="0">
+              <a:buNone/>
+            </a:pPr>
+            <a:endParaRPr lang="en-MY" sz="1800" b="1">
+              <a:latin typeface="Courier New" panose="02070309020205020404" pitchFamily="49" charset="0"/>
+              <a:cs typeface="Courier New" panose="02070309020205020404" pitchFamily="49" charset="0"/>
+            </a:endParaRPr>
+          </a:p>
+          <a:p>
+            <a:pPr marL="118872" indent="0">
+              <a:buNone/>
+            </a:pPr>
+            <a:r>
+              <a:rPr lang="en-MY" sz="1800" b="1">
+                <a:latin typeface="Courier New" panose="02070309020205020404" pitchFamily="49" charset="0"/>
+                <a:cs typeface="Courier New" panose="02070309020205020404" pitchFamily="49" charset="0"/>
+              </a:rPr>
+              <a:t>collect([])-&gt;join(', ', ' and ‘); </a:t>
+            </a:r>
+          </a:p>
+          <a:p>
+            <a:pPr marL="118872" indent="0">
+              <a:buNone/>
+            </a:pPr>
+            <a:r>
+              <a:rPr lang="en-MY" sz="1800" b="1">
+                <a:latin typeface="Courier New" panose="02070309020205020404" pitchFamily="49" charset="0"/>
+                <a:cs typeface="Courier New" panose="02070309020205020404" pitchFamily="49" charset="0"/>
+              </a:rPr>
+              <a:t>// '</a:t>
             </a:r>
           </a:p>
         </p:txBody>
@@ -8532,7 +8646,7 @@
         <p:spPr/>
         <p:txBody>
           <a:bodyPr>
-            <a:normAutofit lnSpcReduction="10000"/>
+            <a:normAutofit fontScale="92500"/>
           </a:bodyPr>
           <a:lstStyle/>
           <a:p>
@@ -8565,19 +8679,52 @@
                 <a:latin typeface="Courier New" panose="02070309020205020404" pitchFamily="49" charset="0"/>
                 <a:cs typeface="Courier New" panose="02070309020205020404" pitchFamily="49" charset="0"/>
               </a:rPr>
-              <a:t>	'prod-100' =&gt; ['product_id' =&gt; 'prod-100', 'name’ 		=&gt; 'Desk’],</a:t>
-            </a:r>
-          </a:p>
-          <a:p>
-            <a:pPr marL="118872" indent="0">
-              <a:buNone/>
-            </a:pPr>
-            <a:r>
-              <a:rPr lang="en-MY" sz="1900" b="1">
-                <a:latin typeface="Courier New" panose="02070309020205020404" pitchFamily="49" charset="0"/>
-                <a:cs typeface="Courier New" panose="02070309020205020404" pitchFamily="49" charset="0"/>
-              </a:rPr>
-              <a:t>	'prod-200' =&gt; ['product_id' =&gt; 'prod-200', 'name’ 		=&gt; 'Chair'],</a:t>
+              <a:t>	'prod-100' =&gt; </a:t>
+            </a:r>
+          </a:p>
+          <a:p>
+            <a:pPr marL="118872" indent="0">
+              <a:buNone/>
+            </a:pPr>
+            <a:r>
+              <a:rPr lang="en-MY" sz="1900" b="1">
+                <a:latin typeface="Courier New" panose="02070309020205020404" pitchFamily="49" charset="0"/>
+                <a:cs typeface="Courier New" panose="02070309020205020404" pitchFamily="49" charset="0"/>
+              </a:rPr>
+              <a:t>['product_id' =&gt; 'prod-100', 'name’ 	=&gt; 'Desk’],</a:t>
+            </a:r>
+          </a:p>
+          <a:p>
+            <a:pPr marL="118872" indent="0">
+              <a:buNone/>
+            </a:pPr>
+            <a:endParaRPr lang="en-MY" sz="1900" b="1">
+              <a:latin typeface="Courier New" panose="02070309020205020404" pitchFamily="49" charset="0"/>
+              <a:cs typeface="Courier New" panose="02070309020205020404" pitchFamily="49" charset="0"/>
+            </a:endParaRPr>
+          </a:p>
+          <a:p>
+            <a:pPr marL="118872" indent="0">
+              <a:buNone/>
+            </a:pPr>
+            <a:r>
+              <a:rPr lang="en-MY" sz="1900" b="1">
+                <a:latin typeface="Courier New" panose="02070309020205020404" pitchFamily="49" charset="0"/>
+                <a:cs typeface="Courier New" panose="02070309020205020404" pitchFamily="49" charset="0"/>
+              </a:rPr>
+              <a:t>	'prod-200' =&gt; </a:t>
+            </a:r>
+          </a:p>
+          <a:p>
+            <a:pPr marL="118872" indent="0">
+              <a:buNone/>
+            </a:pPr>
+            <a:r>
+              <a:rPr lang="en-MY" sz="1900" b="1">
+                <a:latin typeface="Courier New" panose="02070309020205020404" pitchFamily="49" charset="0"/>
+                <a:cs typeface="Courier New" panose="02070309020205020404" pitchFamily="49" charset="0"/>
+              </a:rPr>
+              <a:t>['product_id' =&gt; 'prod-200', 'name’ 	=&gt; 'Chair'],</a:t>
             </a:r>
           </a:p>
           <a:p>
@@ -9229,6 +9376,33 @@
             <a:pPr marL="118872" indent="0">
               <a:buNone/>
             </a:pPr>
+            <a:endParaRPr lang="en-MY" sz="1900" b="1">
+              <a:latin typeface="Courier New" panose="02070309020205020404" pitchFamily="49" charset="0"/>
+              <a:cs typeface="Courier New" panose="02070309020205020404" pitchFamily="49" charset="0"/>
+            </a:endParaRPr>
+          </a:p>
+          <a:p>
+            <a:pPr marL="118872" indent="0">
+              <a:buNone/>
+            </a:pPr>
+            <a:r>
+              <a:rPr lang="en-MY" sz="1900" b="1">
+                <a:latin typeface="Courier New" panose="02070309020205020404" pitchFamily="49" charset="0"/>
+                <a:cs typeface="Courier New" panose="02070309020205020404" pitchFamily="49" charset="0"/>
+              </a:rPr>
+              <a:t>// 5</a:t>
+            </a:r>
+          </a:p>
+          <a:p>
+            <a:pPr marL="118872" indent="0">
+              <a:buNone/>
+            </a:pPr>
+            <a:endParaRPr lang="en-MY"/>
+          </a:p>
+          <a:p>
+            <a:pPr marL="118872" indent="0">
+              <a:buNone/>
+            </a:pPr>
             <a:endParaRPr lang="en-MY"/>
           </a:p>
         </p:txBody>
@@ -11743,7 +11917,7 @@
                 <a:latin typeface="Courier New" panose="02070309020205020404" pitchFamily="49" charset="0"/>
                 <a:cs typeface="Courier New" panose="02070309020205020404" pitchFamily="49" charset="0"/>
               </a:rPr>
-              <a:t>$replaced = $collection-&gt;replace([1 =&gt; 'Victoria', 3 =&gt; 'Finn']);</a:t>
+              <a:t>$replaced = $collection-&gt;replace([1 =&gt; ‘Victoria', 3 =&gt; 'Finn']);</a:t>
             </a:r>
           </a:p>
           <a:p>
@@ -11791,7 +11965,7 @@
                 <a:latin typeface="Courier New" panose="02070309020205020404" pitchFamily="49" charset="0"/>
                 <a:cs typeface="Courier New" panose="02070309020205020404" pitchFamily="49" charset="0"/>
               </a:rPr>
-              <a:t>// ['Taylor', 'Victoria', 'James', 'Finn']</a:t>
+              <a:t>// ['Taylor’, ‘Victoria', 'James', 'Finn']</a:t>
             </a:r>
           </a:p>
         </p:txBody>
@@ -12141,7 +12315,7 @@
                 <a:latin typeface="Courier New" panose="02070309020205020404" pitchFamily="49" charset="0"/>
                 <a:cs typeface="Courier New" panose="02070309020205020404" pitchFamily="49" charset="0"/>
               </a:rPr>
-              <a:t>$collection = collect([2, 4, 6, 8]);</a:t>
+              <a:t>$collection = collect([2, 4, 6, 8, 4]);</a:t>
             </a:r>
           </a:p>
           <a:p>
@@ -12189,7 +12363,7 @@
                 <a:latin typeface="Courier New" panose="02070309020205020404" pitchFamily="49" charset="0"/>
                 <a:cs typeface="Courier New" panose="02070309020205020404" pitchFamily="49" charset="0"/>
               </a:rPr>
-              <a:t>// 1</a:t>
+              <a:t>// 1, 4</a:t>
             </a:r>
             <a:br>
               <a:rPr lang="en-MY"/>

</xml_diff>